<commit_message>
add test extender and design extender board
</commit_message>
<xml_diff>
--- a/Document/Diagram.pptx
+++ b/Document/Diagram.pptx
@@ -7,6 +7,8 @@
   <p:sldIdLst>
     <p:sldId id="256" r:id="rId2"/>
     <p:sldId id="257" r:id="rId3"/>
+    <p:sldId id="258" r:id="rId4"/>
+    <p:sldId id="259" r:id="rId5"/>
   </p:sldIdLst>
   <p:sldSz cx="12192000" cy="6858000"/>
   <p:notesSz cx="6858000" cy="9144000"/>
@@ -262,7 +264,7 @@
           <a:p>
             <a:fld id="{41DB8653-5AD7-4B15-B74A-0F8EE0EA3852}" type="datetimeFigureOut">
               <a:rPr lang="en-US" smtClean="0"/>
-              <a:t>10/14/2021</a:t>
+              <a:t>1/19/2022</a:t>
             </a:fld>
             <a:endParaRPr lang="en-US"/>
           </a:p>
@@ -462,7 +464,7 @@
           <a:p>
             <a:fld id="{41DB8653-5AD7-4B15-B74A-0F8EE0EA3852}" type="datetimeFigureOut">
               <a:rPr lang="en-US" smtClean="0"/>
-              <a:t>10/14/2021</a:t>
+              <a:t>1/19/2022</a:t>
             </a:fld>
             <a:endParaRPr lang="en-US"/>
           </a:p>
@@ -672,7 +674,7 @@
           <a:p>
             <a:fld id="{41DB8653-5AD7-4B15-B74A-0F8EE0EA3852}" type="datetimeFigureOut">
               <a:rPr lang="en-US" smtClean="0"/>
-              <a:t>10/14/2021</a:t>
+              <a:t>1/19/2022</a:t>
             </a:fld>
             <a:endParaRPr lang="en-US"/>
           </a:p>
@@ -872,7 +874,7 @@
           <a:p>
             <a:fld id="{41DB8653-5AD7-4B15-B74A-0F8EE0EA3852}" type="datetimeFigureOut">
               <a:rPr lang="en-US" smtClean="0"/>
-              <a:t>10/14/2021</a:t>
+              <a:t>1/19/2022</a:t>
             </a:fld>
             <a:endParaRPr lang="en-US"/>
           </a:p>
@@ -1148,7 +1150,7 @@
           <a:p>
             <a:fld id="{41DB8653-5AD7-4B15-B74A-0F8EE0EA3852}" type="datetimeFigureOut">
               <a:rPr lang="en-US" smtClean="0"/>
-              <a:t>10/14/2021</a:t>
+              <a:t>1/19/2022</a:t>
             </a:fld>
             <a:endParaRPr lang="en-US"/>
           </a:p>
@@ -1416,7 +1418,7 @@
           <a:p>
             <a:fld id="{41DB8653-5AD7-4B15-B74A-0F8EE0EA3852}" type="datetimeFigureOut">
               <a:rPr lang="en-US" smtClean="0"/>
-              <a:t>10/14/2021</a:t>
+              <a:t>1/19/2022</a:t>
             </a:fld>
             <a:endParaRPr lang="en-US"/>
           </a:p>
@@ -1831,7 +1833,7 @@
           <a:p>
             <a:fld id="{41DB8653-5AD7-4B15-B74A-0F8EE0EA3852}" type="datetimeFigureOut">
               <a:rPr lang="en-US" smtClean="0"/>
-              <a:t>10/14/2021</a:t>
+              <a:t>1/19/2022</a:t>
             </a:fld>
             <a:endParaRPr lang="en-US"/>
           </a:p>
@@ -1973,7 +1975,7 @@
           <a:p>
             <a:fld id="{41DB8653-5AD7-4B15-B74A-0F8EE0EA3852}" type="datetimeFigureOut">
               <a:rPr lang="en-US" smtClean="0"/>
-              <a:t>10/14/2021</a:t>
+              <a:t>1/19/2022</a:t>
             </a:fld>
             <a:endParaRPr lang="en-US"/>
           </a:p>
@@ -2086,7 +2088,7 @@
           <a:p>
             <a:fld id="{41DB8653-5AD7-4B15-B74A-0F8EE0EA3852}" type="datetimeFigureOut">
               <a:rPr lang="en-US" smtClean="0"/>
-              <a:t>10/14/2021</a:t>
+              <a:t>1/19/2022</a:t>
             </a:fld>
             <a:endParaRPr lang="en-US"/>
           </a:p>
@@ -2399,7 +2401,7 @@
           <a:p>
             <a:fld id="{41DB8653-5AD7-4B15-B74A-0F8EE0EA3852}" type="datetimeFigureOut">
               <a:rPr lang="en-US" smtClean="0"/>
-              <a:t>10/14/2021</a:t>
+              <a:t>1/19/2022</a:t>
             </a:fld>
             <a:endParaRPr lang="en-US"/>
           </a:p>
@@ -2688,7 +2690,7 @@
           <a:p>
             <a:fld id="{41DB8653-5AD7-4B15-B74A-0F8EE0EA3852}" type="datetimeFigureOut">
               <a:rPr lang="en-US" smtClean="0"/>
-              <a:t>10/14/2021</a:t>
+              <a:t>1/19/2022</a:t>
             </a:fld>
             <a:endParaRPr lang="en-US"/>
           </a:p>
@@ -2931,7 +2933,7 @@
           <a:p>
             <a:fld id="{41DB8653-5AD7-4B15-B74A-0F8EE0EA3852}" type="datetimeFigureOut">
               <a:rPr lang="en-US" smtClean="0"/>
-              <a:t>10/14/2021</a:t>
+              <a:t>1/19/2022</a:t>
             </a:fld>
             <a:endParaRPr lang="en-US"/>
           </a:p>
@@ -8567,6 +8569,1807 @@
 </p:sld>
 </file>
 
+<file path=ppt/slides/slide3.xml><?xml version="1.0" encoding="utf-8"?>
+<p:sld xmlns:a="http://schemas.openxmlformats.org/drawingml/2006/main" xmlns:r="http://schemas.openxmlformats.org/officeDocument/2006/relationships" xmlns:p="http://schemas.openxmlformats.org/presentationml/2006/main">
+  <p:cSld>
+    <p:spTree>
+      <p:nvGrpSpPr>
+        <p:cNvPr id="1" name=""/>
+        <p:cNvGrpSpPr/>
+        <p:nvPr/>
+      </p:nvGrpSpPr>
+      <p:grpSpPr>
+        <a:xfrm>
+          <a:off x="0" y="0"/>
+          <a:ext cx="0" cy="0"/>
+          <a:chOff x="0" y="0"/>
+          <a:chExt cx="0" cy="0"/>
+        </a:xfrm>
+      </p:grpSpPr>
+      <p:sp>
+        <p:nvSpPr>
+          <p:cNvPr id="4" name="สี่เหลี่ยมผืนผ้า 3">
+            <a:extLst>
+              <a:ext uri="{FF2B5EF4-FFF2-40B4-BE49-F238E27FC236}">
+                <a16:creationId xmlns:a16="http://schemas.microsoft.com/office/drawing/2014/main" id="{69DE8279-0DD5-44A0-9BAA-C095D4734A1F}"/>
+              </a:ext>
+            </a:extLst>
+          </p:cNvPr>
+          <p:cNvSpPr/>
+          <p:nvPr/>
+        </p:nvSpPr>
+        <p:spPr>
+          <a:xfrm>
+            <a:off x="3879669" y="381000"/>
+            <a:ext cx="4432662" cy="6096000"/>
+          </a:xfrm>
+          <a:prstGeom prst="rect">
+            <a:avLst/>
+          </a:prstGeom>
+          <a:noFill/>
+          <a:ln w="57150">
+            <a:solidFill>
+              <a:schemeClr val="tx1"/>
+            </a:solidFill>
+          </a:ln>
+        </p:spPr>
+        <p:style>
+          <a:lnRef idx="2">
+            <a:schemeClr val="accent1">
+              <a:shade val="50000"/>
+            </a:schemeClr>
+          </a:lnRef>
+          <a:fillRef idx="1">
+            <a:schemeClr val="accent1"/>
+          </a:fillRef>
+          <a:effectRef idx="0">
+            <a:schemeClr val="accent1"/>
+          </a:effectRef>
+          <a:fontRef idx="minor">
+            <a:schemeClr val="lt1"/>
+          </a:fontRef>
+        </p:style>
+        <p:txBody>
+          <a:bodyPr rtlCol="0" anchor="ctr"/>
+          <a:lstStyle/>
+          <a:p>
+            <a:pPr algn="ctr"/>
+            <a:endParaRPr lang="en-US" dirty="0"/>
+          </a:p>
+        </p:txBody>
+      </p:sp>
+      <p:sp>
+        <p:nvSpPr>
+          <p:cNvPr id="5" name="สี่เหลี่ยมผืนผ้า 4">
+            <a:extLst>
+              <a:ext uri="{FF2B5EF4-FFF2-40B4-BE49-F238E27FC236}">
+                <a16:creationId xmlns:a16="http://schemas.microsoft.com/office/drawing/2014/main" id="{A93441EB-997B-42C8-B3B9-33EBAA7719CA}"/>
+              </a:ext>
+            </a:extLst>
+          </p:cNvPr>
+          <p:cNvSpPr/>
+          <p:nvPr/>
+        </p:nvSpPr>
+        <p:spPr>
+          <a:xfrm>
+            <a:off x="4119154" y="566057"/>
+            <a:ext cx="296091" cy="5085806"/>
+          </a:xfrm>
+          <a:prstGeom prst="rect">
+            <a:avLst/>
+          </a:prstGeom>
+        </p:spPr>
+        <p:style>
+          <a:lnRef idx="2">
+            <a:schemeClr val="accent1">
+              <a:shade val="50000"/>
+            </a:schemeClr>
+          </a:lnRef>
+          <a:fillRef idx="1">
+            <a:schemeClr val="accent1"/>
+          </a:fillRef>
+          <a:effectRef idx="0">
+            <a:schemeClr val="accent1"/>
+          </a:effectRef>
+          <a:fontRef idx="minor">
+            <a:schemeClr val="lt1"/>
+          </a:fontRef>
+        </p:style>
+        <p:txBody>
+          <a:bodyPr rtlCol="0" anchor="ctr"/>
+          <a:lstStyle/>
+          <a:p>
+            <a:pPr algn="ctr"/>
+            <a:endParaRPr lang="en-US"/>
+          </a:p>
+        </p:txBody>
+      </p:sp>
+      <p:sp>
+        <p:nvSpPr>
+          <p:cNvPr id="6" name="สี่เหลี่ยมผืนผ้า 5">
+            <a:extLst>
+              <a:ext uri="{FF2B5EF4-FFF2-40B4-BE49-F238E27FC236}">
+                <a16:creationId xmlns:a16="http://schemas.microsoft.com/office/drawing/2014/main" id="{4D672C2F-2C37-4F85-8D25-FC5279555C3C}"/>
+              </a:ext>
+            </a:extLst>
+          </p:cNvPr>
+          <p:cNvSpPr/>
+          <p:nvPr/>
+        </p:nvSpPr>
+        <p:spPr>
+          <a:xfrm>
+            <a:off x="7785465" y="566057"/>
+            <a:ext cx="296091" cy="5085806"/>
+          </a:xfrm>
+          <a:prstGeom prst="rect">
+            <a:avLst/>
+          </a:prstGeom>
+        </p:spPr>
+        <p:style>
+          <a:lnRef idx="2">
+            <a:schemeClr val="accent1">
+              <a:shade val="50000"/>
+            </a:schemeClr>
+          </a:lnRef>
+          <a:fillRef idx="1">
+            <a:schemeClr val="accent1"/>
+          </a:fillRef>
+          <a:effectRef idx="0">
+            <a:schemeClr val="accent1"/>
+          </a:effectRef>
+          <a:fontRef idx="minor">
+            <a:schemeClr val="lt1"/>
+          </a:fontRef>
+        </p:style>
+        <p:txBody>
+          <a:bodyPr rtlCol="0" anchor="ctr"/>
+          <a:lstStyle/>
+          <a:p>
+            <a:pPr algn="ctr"/>
+            <a:endParaRPr lang="en-US"/>
+          </a:p>
+        </p:txBody>
+      </p:sp>
+      <p:sp>
+        <p:nvSpPr>
+          <p:cNvPr id="8" name="สี่เหลี่ยมผืนผ้า 7">
+            <a:extLst>
+              <a:ext uri="{FF2B5EF4-FFF2-40B4-BE49-F238E27FC236}">
+                <a16:creationId xmlns:a16="http://schemas.microsoft.com/office/drawing/2014/main" id="{19E7B733-9375-4276-98CE-39B84A0B25E1}"/>
+              </a:ext>
+            </a:extLst>
+          </p:cNvPr>
+          <p:cNvSpPr/>
+          <p:nvPr/>
+        </p:nvSpPr>
+        <p:spPr>
+          <a:xfrm>
+            <a:off x="4415245" y="566057"/>
+            <a:ext cx="3361512" cy="348343"/>
+          </a:xfrm>
+          <a:prstGeom prst="rect">
+            <a:avLst/>
+          </a:prstGeom>
+        </p:spPr>
+        <p:style>
+          <a:lnRef idx="2">
+            <a:schemeClr val="accent1">
+              <a:shade val="50000"/>
+            </a:schemeClr>
+          </a:lnRef>
+          <a:fillRef idx="1">
+            <a:schemeClr val="accent1"/>
+          </a:fillRef>
+          <a:effectRef idx="0">
+            <a:schemeClr val="accent1"/>
+          </a:effectRef>
+          <a:fontRef idx="minor">
+            <a:schemeClr val="lt1"/>
+          </a:fontRef>
+        </p:style>
+        <p:txBody>
+          <a:bodyPr rtlCol="0" anchor="ctr"/>
+          <a:lstStyle/>
+          <a:p>
+            <a:pPr algn="ctr"/>
+            <a:endParaRPr lang="en-US"/>
+          </a:p>
+        </p:txBody>
+      </p:sp>
+      <p:sp>
+        <p:nvSpPr>
+          <p:cNvPr id="9" name="สี่เหลี่ยมผืนผ้า 8">
+            <a:extLst>
+              <a:ext uri="{FF2B5EF4-FFF2-40B4-BE49-F238E27FC236}">
+                <a16:creationId xmlns:a16="http://schemas.microsoft.com/office/drawing/2014/main" id="{9D4B71DA-E5EE-43B5-926D-C2D2572D7506}"/>
+              </a:ext>
+            </a:extLst>
+          </p:cNvPr>
+          <p:cNvSpPr/>
+          <p:nvPr/>
+        </p:nvSpPr>
+        <p:spPr>
+          <a:xfrm>
+            <a:off x="4423953" y="2407920"/>
+            <a:ext cx="3361512" cy="348343"/>
+          </a:xfrm>
+          <a:prstGeom prst="rect">
+            <a:avLst/>
+          </a:prstGeom>
+        </p:spPr>
+        <p:style>
+          <a:lnRef idx="2">
+            <a:schemeClr val="accent1">
+              <a:shade val="50000"/>
+            </a:schemeClr>
+          </a:lnRef>
+          <a:fillRef idx="1">
+            <a:schemeClr val="accent1"/>
+          </a:fillRef>
+          <a:effectRef idx="0">
+            <a:schemeClr val="accent1"/>
+          </a:effectRef>
+          <a:fontRef idx="minor">
+            <a:schemeClr val="lt1"/>
+          </a:fontRef>
+        </p:style>
+        <p:txBody>
+          <a:bodyPr rtlCol="0" anchor="ctr"/>
+          <a:lstStyle/>
+          <a:p>
+            <a:pPr algn="ctr"/>
+            <a:endParaRPr lang="en-US"/>
+          </a:p>
+        </p:txBody>
+      </p:sp>
+      <p:sp>
+        <p:nvSpPr>
+          <p:cNvPr id="10" name="สี่เหลี่ยมผืนผ้า 9">
+            <a:extLst>
+              <a:ext uri="{FF2B5EF4-FFF2-40B4-BE49-F238E27FC236}">
+                <a16:creationId xmlns:a16="http://schemas.microsoft.com/office/drawing/2014/main" id="{E70361A9-93E3-47BC-86F6-B5B89CFB545D}"/>
+              </a:ext>
+            </a:extLst>
+          </p:cNvPr>
+          <p:cNvSpPr/>
+          <p:nvPr/>
+        </p:nvSpPr>
+        <p:spPr>
+          <a:xfrm>
+            <a:off x="4415245" y="5298813"/>
+            <a:ext cx="3361512" cy="348343"/>
+          </a:xfrm>
+          <a:prstGeom prst="rect">
+            <a:avLst/>
+          </a:prstGeom>
+        </p:spPr>
+        <p:style>
+          <a:lnRef idx="2">
+            <a:schemeClr val="accent1">
+              <a:shade val="50000"/>
+            </a:schemeClr>
+          </a:lnRef>
+          <a:fillRef idx="1">
+            <a:schemeClr val="accent1"/>
+          </a:fillRef>
+          <a:effectRef idx="0">
+            <a:schemeClr val="accent1"/>
+          </a:effectRef>
+          <a:fontRef idx="minor">
+            <a:schemeClr val="lt1"/>
+          </a:fontRef>
+        </p:style>
+        <p:txBody>
+          <a:bodyPr rtlCol="0" anchor="ctr"/>
+          <a:lstStyle/>
+          <a:p>
+            <a:pPr algn="ctr"/>
+            <a:endParaRPr lang="en-US"/>
+          </a:p>
+        </p:txBody>
+      </p:sp>
+      <p:sp>
+        <p:nvSpPr>
+          <p:cNvPr id="11" name="สี่เหลี่ยมผืนผ้า 10">
+            <a:extLst>
+              <a:ext uri="{FF2B5EF4-FFF2-40B4-BE49-F238E27FC236}">
+                <a16:creationId xmlns:a16="http://schemas.microsoft.com/office/drawing/2014/main" id="{55155F80-BF8F-4112-8FBE-4A26DC05CC53}"/>
+              </a:ext>
+            </a:extLst>
+          </p:cNvPr>
+          <p:cNvSpPr/>
+          <p:nvPr/>
+        </p:nvSpPr>
+        <p:spPr>
+          <a:xfrm>
+            <a:off x="4887332" y="1065010"/>
+            <a:ext cx="862149" cy="1132114"/>
+          </a:xfrm>
+          <a:prstGeom prst="rect">
+            <a:avLst/>
+          </a:prstGeom>
+        </p:spPr>
+        <p:style>
+          <a:lnRef idx="2">
+            <a:schemeClr val="accent2">
+              <a:shade val="50000"/>
+            </a:schemeClr>
+          </a:lnRef>
+          <a:fillRef idx="1">
+            <a:schemeClr val="accent2"/>
+          </a:fillRef>
+          <a:effectRef idx="0">
+            <a:schemeClr val="accent2"/>
+          </a:effectRef>
+          <a:fontRef idx="minor">
+            <a:schemeClr val="lt1"/>
+          </a:fontRef>
+        </p:style>
+        <p:txBody>
+          <a:bodyPr rtlCol="0" anchor="ctr"/>
+          <a:lstStyle/>
+          <a:p>
+            <a:pPr algn="ctr"/>
+            <a:r>
+              <a:rPr lang="en-US" sz="1100" dirty="0"/>
+              <a:t>Breaker</a:t>
+            </a:r>
+            <a:endParaRPr lang="en-US" dirty="0"/>
+          </a:p>
+        </p:txBody>
+      </p:sp>
+      <p:sp>
+        <p:nvSpPr>
+          <p:cNvPr id="12" name="สี่เหลี่ยมผืนผ้า 11">
+            <a:extLst>
+              <a:ext uri="{FF2B5EF4-FFF2-40B4-BE49-F238E27FC236}">
+                <a16:creationId xmlns:a16="http://schemas.microsoft.com/office/drawing/2014/main" id="{09D3DF52-648D-4BD6-9A06-E4A8EE78725E}"/>
+              </a:ext>
+            </a:extLst>
+          </p:cNvPr>
+          <p:cNvSpPr/>
+          <p:nvPr/>
+        </p:nvSpPr>
+        <p:spPr>
+          <a:xfrm>
+            <a:off x="6457420" y="1072976"/>
+            <a:ext cx="862149" cy="1132114"/>
+          </a:xfrm>
+          <a:prstGeom prst="rect">
+            <a:avLst/>
+          </a:prstGeom>
+        </p:spPr>
+        <p:style>
+          <a:lnRef idx="2">
+            <a:schemeClr val="accent6">
+              <a:shade val="50000"/>
+            </a:schemeClr>
+          </a:lnRef>
+          <a:fillRef idx="1">
+            <a:schemeClr val="accent6"/>
+          </a:fillRef>
+          <a:effectRef idx="0">
+            <a:schemeClr val="accent6"/>
+          </a:effectRef>
+          <a:fontRef idx="minor">
+            <a:schemeClr val="lt1"/>
+          </a:fontRef>
+        </p:style>
+        <p:txBody>
+          <a:bodyPr rtlCol="0" anchor="ctr"/>
+          <a:lstStyle/>
+          <a:p>
+            <a:pPr algn="ctr"/>
+            <a:r>
+              <a:rPr lang="en-US" sz="1200" dirty="0"/>
+              <a:t>Power supply 5V</a:t>
+            </a:r>
+          </a:p>
+        </p:txBody>
+      </p:sp>
+      <p:pic>
+        <p:nvPicPr>
+          <p:cNvPr id="15" name="รูปภาพ 14">
+            <a:extLst>
+              <a:ext uri="{FF2B5EF4-FFF2-40B4-BE49-F238E27FC236}">
+                <a16:creationId xmlns:a16="http://schemas.microsoft.com/office/drawing/2014/main" id="{78A30DE2-929F-4D18-9B3B-A5233E97A4CF}"/>
+              </a:ext>
+            </a:extLst>
+          </p:cNvPr>
+          <p:cNvPicPr>
+            <a:picLocks noChangeAspect="1"/>
+          </p:cNvPicPr>
+          <p:nvPr/>
+        </p:nvPicPr>
+        <p:blipFill>
+          <a:blip r:embed="rId2"/>
+          <a:stretch>
+            <a:fillRect/>
+          </a:stretch>
+        </p:blipFill>
+        <p:spPr>
+          <a:xfrm>
+            <a:off x="4667764" y="4783182"/>
+            <a:ext cx="772182" cy="373035"/>
+          </a:xfrm>
+          <a:prstGeom prst="rect">
+            <a:avLst/>
+          </a:prstGeom>
+        </p:spPr>
+      </p:pic>
+      <p:sp>
+        <p:nvSpPr>
+          <p:cNvPr id="16" name="สี่เหลี่ยมผืนผ้า 15">
+            <a:extLst>
+              <a:ext uri="{FF2B5EF4-FFF2-40B4-BE49-F238E27FC236}">
+                <a16:creationId xmlns:a16="http://schemas.microsoft.com/office/drawing/2014/main" id="{8A71CC25-31E5-4949-9C19-FE52ABCBEF10}"/>
+              </a:ext>
+            </a:extLst>
+          </p:cNvPr>
+          <p:cNvSpPr/>
+          <p:nvPr/>
+        </p:nvSpPr>
+        <p:spPr>
+          <a:xfrm>
+            <a:off x="4902190" y="3514637"/>
+            <a:ext cx="1362893" cy="947058"/>
+          </a:xfrm>
+          <a:prstGeom prst="rect">
+            <a:avLst/>
+          </a:prstGeom>
+        </p:spPr>
+        <p:style>
+          <a:lnRef idx="1">
+            <a:schemeClr val="accent4"/>
+          </a:lnRef>
+          <a:fillRef idx="2">
+            <a:schemeClr val="accent4"/>
+          </a:fillRef>
+          <a:effectRef idx="1">
+            <a:schemeClr val="accent4"/>
+          </a:effectRef>
+          <a:fontRef idx="minor">
+            <a:schemeClr val="dk1"/>
+          </a:fontRef>
+        </p:style>
+        <p:txBody>
+          <a:bodyPr rtlCol="0" anchor="ctr"/>
+          <a:lstStyle/>
+          <a:p>
+            <a:pPr algn="ctr"/>
+            <a:r>
+              <a:rPr lang="en-US" sz="1200" dirty="0"/>
+              <a:t>Extender board</a:t>
+            </a:r>
+          </a:p>
+        </p:txBody>
+      </p:sp>
+      <p:sp>
+        <p:nvSpPr>
+          <p:cNvPr id="17" name="สี่เหลี่ยมผืนผ้า 16">
+            <a:extLst>
+              <a:ext uri="{FF2B5EF4-FFF2-40B4-BE49-F238E27FC236}">
+                <a16:creationId xmlns:a16="http://schemas.microsoft.com/office/drawing/2014/main" id="{90F0FDF3-0056-4540-937B-30C3547A7942}"/>
+              </a:ext>
+            </a:extLst>
+          </p:cNvPr>
+          <p:cNvSpPr/>
+          <p:nvPr/>
+        </p:nvSpPr>
+        <p:spPr>
+          <a:xfrm>
+            <a:off x="6723018" y="3514637"/>
+            <a:ext cx="596551" cy="947058"/>
+          </a:xfrm>
+          <a:prstGeom prst="rect">
+            <a:avLst/>
+          </a:prstGeom>
+        </p:spPr>
+        <p:style>
+          <a:lnRef idx="1">
+            <a:schemeClr val="accent6"/>
+          </a:lnRef>
+          <a:fillRef idx="2">
+            <a:schemeClr val="accent6"/>
+          </a:fillRef>
+          <a:effectRef idx="1">
+            <a:schemeClr val="accent6"/>
+          </a:effectRef>
+          <a:fontRef idx="minor">
+            <a:schemeClr val="dk1"/>
+          </a:fontRef>
+        </p:style>
+        <p:txBody>
+          <a:bodyPr rtlCol="0" anchor="ctr"/>
+          <a:lstStyle/>
+          <a:p>
+            <a:pPr algn="ctr"/>
+            <a:r>
+              <a:rPr lang="en-US" sz="600" dirty="0"/>
+              <a:t>Raspberry pi</a:t>
+            </a:r>
+          </a:p>
+        </p:txBody>
+      </p:sp>
+      <p:pic>
+        <p:nvPicPr>
+          <p:cNvPr id="18" name="รูปภาพ 17">
+            <a:extLst>
+              <a:ext uri="{FF2B5EF4-FFF2-40B4-BE49-F238E27FC236}">
+                <a16:creationId xmlns:a16="http://schemas.microsoft.com/office/drawing/2014/main" id="{25796B3E-461A-40EF-880D-C43479DF63BD}"/>
+              </a:ext>
+            </a:extLst>
+          </p:cNvPr>
+          <p:cNvPicPr>
+            <a:picLocks noChangeAspect="1"/>
+          </p:cNvPicPr>
+          <p:nvPr/>
+        </p:nvPicPr>
+        <p:blipFill>
+          <a:blip r:embed="rId2"/>
+          <a:stretch>
+            <a:fillRect/>
+          </a:stretch>
+        </p:blipFill>
+        <p:spPr>
+          <a:xfrm>
+            <a:off x="5714264" y="4783182"/>
+            <a:ext cx="772182" cy="373035"/>
+          </a:xfrm>
+          <a:prstGeom prst="rect">
+            <a:avLst/>
+          </a:prstGeom>
+        </p:spPr>
+      </p:pic>
+      <p:pic>
+        <p:nvPicPr>
+          <p:cNvPr id="21" name="รูปภาพ 20">
+            <a:extLst>
+              <a:ext uri="{FF2B5EF4-FFF2-40B4-BE49-F238E27FC236}">
+                <a16:creationId xmlns:a16="http://schemas.microsoft.com/office/drawing/2014/main" id="{0E02B732-ED86-42F3-90C2-5E6824AB021A}"/>
+              </a:ext>
+            </a:extLst>
+          </p:cNvPr>
+          <p:cNvPicPr>
+            <a:picLocks noChangeAspect="1"/>
+          </p:cNvPicPr>
+          <p:nvPr/>
+        </p:nvPicPr>
+        <p:blipFill>
+          <a:blip r:embed="rId2"/>
+          <a:stretch>
+            <a:fillRect/>
+          </a:stretch>
+        </p:blipFill>
+        <p:spPr>
+          <a:xfrm>
+            <a:off x="6752029" y="4783182"/>
+            <a:ext cx="772182" cy="373035"/>
+          </a:xfrm>
+          <a:prstGeom prst="rect">
+            <a:avLst/>
+          </a:prstGeom>
+        </p:spPr>
+      </p:pic>
+      <p:pic>
+        <p:nvPicPr>
+          <p:cNvPr id="22" name="รูปภาพ 21">
+            <a:extLst>
+              <a:ext uri="{FF2B5EF4-FFF2-40B4-BE49-F238E27FC236}">
+                <a16:creationId xmlns:a16="http://schemas.microsoft.com/office/drawing/2014/main" id="{1BBBD7E5-D109-4235-BA79-97466C3723AB}"/>
+              </a:ext>
+            </a:extLst>
+          </p:cNvPr>
+          <p:cNvPicPr>
+            <a:picLocks noChangeAspect="1"/>
+          </p:cNvPicPr>
+          <p:nvPr/>
+        </p:nvPicPr>
+        <p:blipFill>
+          <a:blip r:embed="rId2"/>
+          <a:stretch>
+            <a:fillRect/>
+          </a:stretch>
+        </p:blipFill>
+        <p:spPr>
+          <a:xfrm rot="10800000">
+            <a:off x="6775272" y="2909022"/>
+            <a:ext cx="772182" cy="373035"/>
+          </a:xfrm>
+          <a:prstGeom prst="rect">
+            <a:avLst/>
+          </a:prstGeom>
+        </p:spPr>
+      </p:pic>
+      <p:pic>
+        <p:nvPicPr>
+          <p:cNvPr id="23" name="รูปภาพ 22">
+            <a:extLst>
+              <a:ext uri="{FF2B5EF4-FFF2-40B4-BE49-F238E27FC236}">
+                <a16:creationId xmlns:a16="http://schemas.microsoft.com/office/drawing/2014/main" id="{83B1ACD2-6059-4DDC-B1B5-65BE61326450}"/>
+              </a:ext>
+            </a:extLst>
+          </p:cNvPr>
+          <p:cNvPicPr>
+            <a:picLocks noChangeAspect="1"/>
+          </p:cNvPicPr>
+          <p:nvPr/>
+        </p:nvPicPr>
+        <p:blipFill>
+          <a:blip r:embed="rId2"/>
+          <a:stretch>
+            <a:fillRect/>
+          </a:stretch>
+        </p:blipFill>
+        <p:spPr>
+          <a:xfrm rot="10800000">
+            <a:off x="5739672" y="2909022"/>
+            <a:ext cx="772182" cy="373035"/>
+          </a:xfrm>
+          <a:prstGeom prst="rect">
+            <a:avLst/>
+          </a:prstGeom>
+        </p:spPr>
+      </p:pic>
+      <p:pic>
+        <p:nvPicPr>
+          <p:cNvPr id="24" name="รูปภาพ 23">
+            <a:extLst>
+              <a:ext uri="{FF2B5EF4-FFF2-40B4-BE49-F238E27FC236}">
+                <a16:creationId xmlns:a16="http://schemas.microsoft.com/office/drawing/2014/main" id="{42A85D09-88C2-41C2-B729-4415FD3AF6D4}"/>
+              </a:ext>
+            </a:extLst>
+          </p:cNvPr>
+          <p:cNvPicPr>
+            <a:picLocks noChangeAspect="1"/>
+          </p:cNvPicPr>
+          <p:nvPr/>
+        </p:nvPicPr>
+        <p:blipFill>
+          <a:blip r:embed="rId2"/>
+          <a:stretch>
+            <a:fillRect/>
+          </a:stretch>
+        </p:blipFill>
+        <p:spPr>
+          <a:xfrm rot="10800000">
+            <a:off x="4652560" y="2904666"/>
+            <a:ext cx="772182" cy="373035"/>
+          </a:xfrm>
+          <a:prstGeom prst="rect">
+            <a:avLst/>
+          </a:prstGeom>
+        </p:spPr>
+      </p:pic>
+      <p:sp>
+        <p:nvSpPr>
+          <p:cNvPr id="27" name="สี่เหลี่ยมผืนผ้า 26">
+            <a:extLst>
+              <a:ext uri="{FF2B5EF4-FFF2-40B4-BE49-F238E27FC236}">
+                <a16:creationId xmlns:a16="http://schemas.microsoft.com/office/drawing/2014/main" id="{D9F327F1-C70C-4CB1-981F-86F9734E9E48}"/>
+              </a:ext>
+            </a:extLst>
+          </p:cNvPr>
+          <p:cNvSpPr/>
+          <p:nvPr/>
+        </p:nvSpPr>
+        <p:spPr>
+          <a:xfrm>
+            <a:off x="4636796" y="5855793"/>
+            <a:ext cx="2975060" cy="348343"/>
+          </a:xfrm>
+          <a:prstGeom prst="rect">
+            <a:avLst/>
+          </a:prstGeom>
+        </p:spPr>
+        <p:style>
+          <a:lnRef idx="1">
+            <a:schemeClr val="accent1"/>
+          </a:lnRef>
+          <a:fillRef idx="2">
+            <a:schemeClr val="accent1"/>
+          </a:fillRef>
+          <a:effectRef idx="1">
+            <a:schemeClr val="accent1"/>
+          </a:effectRef>
+          <a:fontRef idx="minor">
+            <a:schemeClr val="dk1"/>
+          </a:fontRef>
+        </p:style>
+        <p:txBody>
+          <a:bodyPr rtlCol="0" anchor="ctr"/>
+          <a:lstStyle/>
+          <a:p>
+            <a:pPr algn="ctr"/>
+            <a:r>
+              <a:rPr lang="en-US" sz="1100" dirty="0"/>
+              <a:t>Terminal</a:t>
+            </a:r>
+          </a:p>
+        </p:txBody>
+      </p:sp>
+      <p:cxnSp>
+        <p:nvCxnSpPr>
+          <p:cNvPr id="32" name="ลูกศรเชื่อมต่อแบบตรง 31">
+            <a:extLst>
+              <a:ext uri="{FF2B5EF4-FFF2-40B4-BE49-F238E27FC236}">
+                <a16:creationId xmlns:a16="http://schemas.microsoft.com/office/drawing/2014/main" id="{C759456D-C5F1-4B0A-B27D-F2FA1EDEC94B}"/>
+              </a:ext>
+            </a:extLst>
+          </p:cNvPr>
+          <p:cNvCxnSpPr>
+            <a:stCxn id="16" idx="3"/>
+            <a:endCxn id="17" idx="1"/>
+          </p:cNvCxnSpPr>
+          <p:nvPr/>
+        </p:nvCxnSpPr>
+        <p:spPr>
+          <a:xfrm>
+            <a:off x="6265083" y="3988166"/>
+            <a:ext cx="457935" cy="0"/>
+          </a:xfrm>
+          <a:prstGeom prst="straightConnector1">
+            <a:avLst/>
+          </a:prstGeom>
+          <a:ln w="19050">
+            <a:headEnd type="triangle"/>
+            <a:tailEnd type="triangle"/>
+          </a:ln>
+        </p:spPr>
+        <p:style>
+          <a:lnRef idx="1">
+            <a:schemeClr val="accent2"/>
+          </a:lnRef>
+          <a:fillRef idx="0">
+            <a:schemeClr val="accent2"/>
+          </a:fillRef>
+          <a:effectRef idx="0">
+            <a:schemeClr val="accent2"/>
+          </a:effectRef>
+          <a:fontRef idx="minor">
+            <a:schemeClr val="tx1"/>
+          </a:fontRef>
+        </p:style>
+      </p:cxnSp>
+      <p:cxnSp>
+        <p:nvCxnSpPr>
+          <p:cNvPr id="39" name="ตัวเชื่อมต่อ: หักมุม 38">
+            <a:extLst>
+              <a:ext uri="{FF2B5EF4-FFF2-40B4-BE49-F238E27FC236}">
+                <a16:creationId xmlns:a16="http://schemas.microsoft.com/office/drawing/2014/main" id="{1098A258-17EF-4253-9FC6-CC1EA16E2B58}"/>
+              </a:ext>
+            </a:extLst>
+          </p:cNvPr>
+          <p:cNvCxnSpPr>
+            <a:stCxn id="16" idx="2"/>
+            <a:endCxn id="15" idx="0"/>
+          </p:cNvCxnSpPr>
+          <p:nvPr/>
+        </p:nvCxnSpPr>
+        <p:spPr>
+          <a:xfrm rot="5400000">
+            <a:off x="5158003" y="4357547"/>
+            <a:ext cx="321487" cy="529782"/>
+          </a:xfrm>
+          <a:prstGeom prst="bentConnector3">
+            <a:avLst/>
+          </a:prstGeom>
+          <a:ln w="19050">
+            <a:headEnd type="none" w="med" len="med"/>
+            <a:tailEnd type="triangle" w="med" len="med"/>
+          </a:ln>
+        </p:spPr>
+        <p:style>
+          <a:lnRef idx="1">
+            <a:schemeClr val="accent1"/>
+          </a:lnRef>
+          <a:fillRef idx="0">
+            <a:schemeClr val="accent1"/>
+          </a:fillRef>
+          <a:effectRef idx="0">
+            <a:schemeClr val="accent1"/>
+          </a:effectRef>
+          <a:fontRef idx="minor">
+            <a:schemeClr val="tx1"/>
+          </a:fontRef>
+        </p:style>
+      </p:cxnSp>
+      <p:cxnSp>
+        <p:nvCxnSpPr>
+          <p:cNvPr id="46" name="ตัวเชื่อมต่อ: หักมุม 45">
+            <a:extLst>
+              <a:ext uri="{FF2B5EF4-FFF2-40B4-BE49-F238E27FC236}">
+                <a16:creationId xmlns:a16="http://schemas.microsoft.com/office/drawing/2014/main" id="{675056DD-9BCE-4F60-8AF8-B0A283FB4E07}"/>
+              </a:ext>
+            </a:extLst>
+          </p:cNvPr>
+          <p:cNvCxnSpPr>
+            <a:cxnSpLocks/>
+            <a:stCxn id="18" idx="0"/>
+            <a:endCxn id="16" idx="2"/>
+          </p:cNvCxnSpPr>
+          <p:nvPr/>
+        </p:nvCxnSpPr>
+        <p:spPr>
+          <a:xfrm rot="16200000" flipV="1">
+            <a:off x="5681253" y="4364080"/>
+            <a:ext cx="321487" cy="516718"/>
+          </a:xfrm>
+          <a:prstGeom prst="bentConnector3">
+            <a:avLst>
+              <a:gd name="adj1" fmla="val 50000"/>
+            </a:avLst>
+          </a:prstGeom>
+          <a:ln w="19050">
+            <a:headEnd type="triangle" w="med" len="med"/>
+            <a:tailEnd type="none" w="med" len="med"/>
+          </a:ln>
+        </p:spPr>
+        <p:style>
+          <a:lnRef idx="1">
+            <a:schemeClr val="accent1"/>
+          </a:lnRef>
+          <a:fillRef idx="0">
+            <a:schemeClr val="accent1"/>
+          </a:fillRef>
+          <a:effectRef idx="0">
+            <a:schemeClr val="accent1"/>
+          </a:effectRef>
+          <a:fontRef idx="minor">
+            <a:schemeClr val="tx1"/>
+          </a:fontRef>
+        </p:style>
+      </p:cxnSp>
+      <p:cxnSp>
+        <p:nvCxnSpPr>
+          <p:cNvPr id="53" name="ตัวเชื่อมต่อ: หักมุม 52">
+            <a:extLst>
+              <a:ext uri="{FF2B5EF4-FFF2-40B4-BE49-F238E27FC236}">
+                <a16:creationId xmlns:a16="http://schemas.microsoft.com/office/drawing/2014/main" id="{00920087-6541-449A-8FCF-19BE148AB334}"/>
+              </a:ext>
+            </a:extLst>
+          </p:cNvPr>
+          <p:cNvCxnSpPr>
+            <a:cxnSpLocks/>
+            <a:stCxn id="21" idx="0"/>
+            <a:endCxn id="16" idx="2"/>
+          </p:cNvCxnSpPr>
+          <p:nvPr/>
+        </p:nvCxnSpPr>
+        <p:spPr>
+          <a:xfrm rot="16200000" flipV="1">
+            <a:off x="6200136" y="3845197"/>
+            <a:ext cx="321487" cy="1554483"/>
+          </a:xfrm>
+          <a:prstGeom prst="bentConnector3">
+            <a:avLst>
+              <a:gd name="adj1" fmla="val 50000"/>
+            </a:avLst>
+          </a:prstGeom>
+          <a:ln w="19050">
+            <a:headEnd type="triangle" w="med" len="med"/>
+            <a:tailEnd type="none" w="med" len="med"/>
+          </a:ln>
+        </p:spPr>
+        <p:style>
+          <a:lnRef idx="1">
+            <a:schemeClr val="accent1"/>
+          </a:lnRef>
+          <a:fillRef idx="0">
+            <a:schemeClr val="accent1"/>
+          </a:fillRef>
+          <a:effectRef idx="0">
+            <a:schemeClr val="accent1"/>
+          </a:effectRef>
+          <a:fontRef idx="minor">
+            <a:schemeClr val="tx1"/>
+          </a:fontRef>
+        </p:style>
+      </p:cxnSp>
+      <p:cxnSp>
+        <p:nvCxnSpPr>
+          <p:cNvPr id="57" name="ตัวเชื่อมต่อ: หักมุม 56">
+            <a:extLst>
+              <a:ext uri="{FF2B5EF4-FFF2-40B4-BE49-F238E27FC236}">
+                <a16:creationId xmlns:a16="http://schemas.microsoft.com/office/drawing/2014/main" id="{71B45D2B-3BE8-4B29-99E5-795809D2D64B}"/>
+              </a:ext>
+            </a:extLst>
+          </p:cNvPr>
+          <p:cNvCxnSpPr>
+            <a:cxnSpLocks/>
+            <a:stCxn id="16" idx="0"/>
+            <a:endCxn id="24" idx="0"/>
+          </p:cNvCxnSpPr>
+          <p:nvPr/>
+        </p:nvCxnSpPr>
+        <p:spPr>
+          <a:xfrm rot="16200000" flipV="1">
+            <a:off x="5192676" y="3123676"/>
+            <a:ext cx="236936" cy="544986"/>
+          </a:xfrm>
+          <a:prstGeom prst="bentConnector3">
+            <a:avLst>
+              <a:gd name="adj1" fmla="val 50000"/>
+            </a:avLst>
+          </a:prstGeom>
+          <a:ln w="19050">
+            <a:headEnd type="none" w="med" len="med"/>
+            <a:tailEnd type="triangle" w="med" len="med"/>
+          </a:ln>
+        </p:spPr>
+        <p:style>
+          <a:lnRef idx="1">
+            <a:schemeClr val="accent1"/>
+          </a:lnRef>
+          <a:fillRef idx="0">
+            <a:schemeClr val="accent1"/>
+          </a:fillRef>
+          <a:effectRef idx="0">
+            <a:schemeClr val="accent1"/>
+          </a:effectRef>
+          <a:fontRef idx="minor">
+            <a:schemeClr val="tx1"/>
+          </a:fontRef>
+        </p:style>
+      </p:cxnSp>
+      <p:cxnSp>
+        <p:nvCxnSpPr>
+          <p:cNvPr id="60" name="ตัวเชื่อมต่อ: หักมุม 59">
+            <a:extLst>
+              <a:ext uri="{FF2B5EF4-FFF2-40B4-BE49-F238E27FC236}">
+                <a16:creationId xmlns:a16="http://schemas.microsoft.com/office/drawing/2014/main" id="{E753A135-64D7-4066-A38E-F6D28399AF5C}"/>
+              </a:ext>
+            </a:extLst>
+          </p:cNvPr>
+          <p:cNvCxnSpPr>
+            <a:cxnSpLocks/>
+            <a:stCxn id="23" idx="0"/>
+            <a:endCxn id="16" idx="0"/>
+          </p:cNvCxnSpPr>
+          <p:nvPr/>
+        </p:nvCxnSpPr>
+        <p:spPr>
+          <a:xfrm rot="5400000">
+            <a:off x="5738410" y="3127284"/>
+            <a:ext cx="232580" cy="542126"/>
+          </a:xfrm>
+          <a:prstGeom prst="bentConnector3">
+            <a:avLst>
+              <a:gd name="adj1" fmla="val 50000"/>
+            </a:avLst>
+          </a:prstGeom>
+          <a:ln w="19050">
+            <a:headEnd type="triangle" w="med" len="med"/>
+            <a:tailEnd type="none" w="med" len="med"/>
+          </a:ln>
+        </p:spPr>
+        <p:style>
+          <a:lnRef idx="1">
+            <a:schemeClr val="accent1"/>
+          </a:lnRef>
+          <a:fillRef idx="0">
+            <a:schemeClr val="accent1"/>
+          </a:fillRef>
+          <a:effectRef idx="0">
+            <a:schemeClr val="accent1"/>
+          </a:effectRef>
+          <a:fontRef idx="minor">
+            <a:schemeClr val="tx1"/>
+          </a:fontRef>
+        </p:style>
+      </p:cxnSp>
+      <p:cxnSp>
+        <p:nvCxnSpPr>
+          <p:cNvPr id="63" name="ตัวเชื่อมต่อ: หักมุม 62">
+            <a:extLst>
+              <a:ext uri="{FF2B5EF4-FFF2-40B4-BE49-F238E27FC236}">
+                <a16:creationId xmlns:a16="http://schemas.microsoft.com/office/drawing/2014/main" id="{18A73374-41A1-4C15-A7CF-4027FC8119AB}"/>
+              </a:ext>
+            </a:extLst>
+          </p:cNvPr>
+          <p:cNvCxnSpPr>
+            <a:cxnSpLocks/>
+            <a:stCxn id="22" idx="0"/>
+            <a:endCxn id="16" idx="0"/>
+          </p:cNvCxnSpPr>
+          <p:nvPr/>
+        </p:nvCxnSpPr>
+        <p:spPr>
+          <a:xfrm rot="5400000">
+            <a:off x="6256210" y="2609484"/>
+            <a:ext cx="232580" cy="1577726"/>
+          </a:xfrm>
+          <a:prstGeom prst="bentConnector3">
+            <a:avLst>
+              <a:gd name="adj1" fmla="val 50000"/>
+            </a:avLst>
+          </a:prstGeom>
+          <a:ln w="19050">
+            <a:headEnd type="triangle" w="med" len="med"/>
+            <a:tailEnd type="none" w="med" len="med"/>
+          </a:ln>
+        </p:spPr>
+        <p:style>
+          <a:lnRef idx="1">
+            <a:schemeClr val="accent1"/>
+          </a:lnRef>
+          <a:fillRef idx="0">
+            <a:schemeClr val="accent1"/>
+          </a:fillRef>
+          <a:effectRef idx="0">
+            <a:schemeClr val="accent1"/>
+          </a:effectRef>
+          <a:fontRef idx="minor">
+            <a:schemeClr val="tx1"/>
+          </a:fontRef>
+        </p:style>
+      </p:cxnSp>
+      <p:cxnSp>
+        <p:nvCxnSpPr>
+          <p:cNvPr id="72" name="ตัวเชื่อมต่อตรง 71">
+            <a:extLst>
+              <a:ext uri="{FF2B5EF4-FFF2-40B4-BE49-F238E27FC236}">
+                <a16:creationId xmlns:a16="http://schemas.microsoft.com/office/drawing/2014/main" id="{8CB837C8-831D-4063-9A71-4CAEAFE13EBF}"/>
+              </a:ext>
+            </a:extLst>
+          </p:cNvPr>
+          <p:cNvCxnSpPr>
+            <a:cxnSpLocks/>
+          </p:cNvCxnSpPr>
+          <p:nvPr/>
+        </p:nvCxnSpPr>
+        <p:spPr>
+          <a:xfrm flipV="1">
+            <a:off x="4267199" y="5470082"/>
+            <a:ext cx="3666311" cy="2902"/>
+          </a:xfrm>
+          <a:prstGeom prst="line">
+            <a:avLst/>
+          </a:prstGeom>
+          <a:ln w="28575"/>
+        </p:spPr>
+        <p:style>
+          <a:lnRef idx="1">
+            <a:schemeClr val="accent2"/>
+          </a:lnRef>
+          <a:fillRef idx="0">
+            <a:schemeClr val="accent2"/>
+          </a:fillRef>
+          <a:effectRef idx="0">
+            <a:schemeClr val="accent2"/>
+          </a:effectRef>
+          <a:fontRef idx="minor">
+            <a:schemeClr val="tx1"/>
+          </a:fontRef>
+        </p:style>
+      </p:cxnSp>
+      <p:cxnSp>
+        <p:nvCxnSpPr>
+          <p:cNvPr id="74" name="ตัวเชื่อมต่อตรง 73">
+            <a:extLst>
+              <a:ext uri="{FF2B5EF4-FFF2-40B4-BE49-F238E27FC236}">
+                <a16:creationId xmlns:a16="http://schemas.microsoft.com/office/drawing/2014/main" id="{2707F931-24B2-4388-B8C4-7FDC14BF36C8}"/>
+              </a:ext>
+            </a:extLst>
+          </p:cNvPr>
+          <p:cNvCxnSpPr>
+            <a:cxnSpLocks/>
+          </p:cNvCxnSpPr>
+          <p:nvPr/>
+        </p:nvCxnSpPr>
+        <p:spPr>
+          <a:xfrm>
+            <a:off x="4267199" y="2582091"/>
+            <a:ext cx="0" cy="2890893"/>
+          </a:xfrm>
+          <a:prstGeom prst="line">
+            <a:avLst/>
+          </a:prstGeom>
+          <a:ln w="28575"/>
+        </p:spPr>
+        <p:style>
+          <a:lnRef idx="1">
+            <a:schemeClr val="accent2"/>
+          </a:lnRef>
+          <a:fillRef idx="0">
+            <a:schemeClr val="accent2"/>
+          </a:fillRef>
+          <a:effectRef idx="0">
+            <a:schemeClr val="accent2"/>
+          </a:effectRef>
+          <a:fontRef idx="minor">
+            <a:schemeClr val="tx1"/>
+          </a:fontRef>
+        </p:style>
+      </p:cxnSp>
+      <p:cxnSp>
+        <p:nvCxnSpPr>
+          <p:cNvPr id="78" name="ตัวเชื่อมต่อตรง 77">
+            <a:extLst>
+              <a:ext uri="{FF2B5EF4-FFF2-40B4-BE49-F238E27FC236}">
+                <a16:creationId xmlns:a16="http://schemas.microsoft.com/office/drawing/2014/main" id="{03A02C88-B8C1-4723-B3E9-5798D860DCE7}"/>
+              </a:ext>
+            </a:extLst>
+          </p:cNvPr>
+          <p:cNvCxnSpPr>
+            <a:cxnSpLocks/>
+          </p:cNvCxnSpPr>
+          <p:nvPr/>
+        </p:nvCxnSpPr>
+        <p:spPr>
+          <a:xfrm>
+            <a:off x="7933510" y="2579189"/>
+            <a:ext cx="0" cy="2890893"/>
+          </a:xfrm>
+          <a:prstGeom prst="line">
+            <a:avLst/>
+          </a:prstGeom>
+          <a:ln w="28575"/>
+        </p:spPr>
+        <p:style>
+          <a:lnRef idx="1">
+            <a:schemeClr val="accent2"/>
+          </a:lnRef>
+          <a:fillRef idx="0">
+            <a:schemeClr val="accent2"/>
+          </a:fillRef>
+          <a:effectRef idx="0">
+            <a:schemeClr val="accent2"/>
+          </a:effectRef>
+          <a:fontRef idx="minor">
+            <a:schemeClr val="tx1"/>
+          </a:fontRef>
+        </p:style>
+      </p:cxnSp>
+      <p:cxnSp>
+        <p:nvCxnSpPr>
+          <p:cNvPr id="80" name="ตัวเชื่อมต่อตรง 79">
+            <a:extLst>
+              <a:ext uri="{FF2B5EF4-FFF2-40B4-BE49-F238E27FC236}">
+                <a16:creationId xmlns:a16="http://schemas.microsoft.com/office/drawing/2014/main" id="{FA71A077-FF3C-43B2-ACC9-04BAB22742D4}"/>
+              </a:ext>
+            </a:extLst>
+          </p:cNvPr>
+          <p:cNvCxnSpPr>
+            <a:cxnSpLocks/>
+          </p:cNvCxnSpPr>
+          <p:nvPr/>
+        </p:nvCxnSpPr>
+        <p:spPr>
+          <a:xfrm>
+            <a:off x="4258491" y="2578125"/>
+            <a:ext cx="3675019" cy="1064"/>
+          </a:xfrm>
+          <a:prstGeom prst="line">
+            <a:avLst/>
+          </a:prstGeom>
+          <a:ln w="28575"/>
+        </p:spPr>
+        <p:style>
+          <a:lnRef idx="1">
+            <a:schemeClr val="accent2"/>
+          </a:lnRef>
+          <a:fillRef idx="0">
+            <a:schemeClr val="accent2"/>
+          </a:fillRef>
+          <a:effectRef idx="0">
+            <a:schemeClr val="accent2"/>
+          </a:effectRef>
+          <a:fontRef idx="minor">
+            <a:schemeClr val="tx1"/>
+          </a:fontRef>
+        </p:style>
+      </p:cxnSp>
+      <p:cxnSp>
+        <p:nvCxnSpPr>
+          <p:cNvPr id="83" name="ตัวเชื่อมต่อตรง 82">
+            <a:extLst>
+              <a:ext uri="{FF2B5EF4-FFF2-40B4-BE49-F238E27FC236}">
+                <a16:creationId xmlns:a16="http://schemas.microsoft.com/office/drawing/2014/main" id="{A98571F7-2A42-4878-A81E-8B5E3BEFE15D}"/>
+              </a:ext>
+            </a:extLst>
+          </p:cNvPr>
+          <p:cNvCxnSpPr>
+            <a:cxnSpLocks/>
+            <a:endCxn id="24" idx="2"/>
+          </p:cNvCxnSpPr>
+          <p:nvPr/>
+        </p:nvCxnSpPr>
+        <p:spPr>
+          <a:xfrm>
+            <a:off x="5038651" y="2578125"/>
+            <a:ext cx="0" cy="326541"/>
+          </a:xfrm>
+          <a:prstGeom prst="line">
+            <a:avLst/>
+          </a:prstGeom>
+          <a:ln w="28575"/>
+        </p:spPr>
+        <p:style>
+          <a:lnRef idx="1">
+            <a:schemeClr val="accent2"/>
+          </a:lnRef>
+          <a:fillRef idx="0">
+            <a:schemeClr val="accent2"/>
+          </a:fillRef>
+          <a:effectRef idx="0">
+            <a:schemeClr val="accent2"/>
+          </a:effectRef>
+          <a:fontRef idx="minor">
+            <a:schemeClr val="tx1"/>
+          </a:fontRef>
+        </p:style>
+      </p:cxnSp>
+      <p:cxnSp>
+        <p:nvCxnSpPr>
+          <p:cNvPr id="87" name="ตัวเชื่อมต่อตรง 86">
+            <a:extLst>
+              <a:ext uri="{FF2B5EF4-FFF2-40B4-BE49-F238E27FC236}">
+                <a16:creationId xmlns:a16="http://schemas.microsoft.com/office/drawing/2014/main" id="{A1AE72CD-167A-4CA9-A7F4-80CC4DA33253}"/>
+              </a:ext>
+            </a:extLst>
+          </p:cNvPr>
+          <p:cNvCxnSpPr>
+            <a:cxnSpLocks/>
+          </p:cNvCxnSpPr>
+          <p:nvPr/>
+        </p:nvCxnSpPr>
+        <p:spPr>
+          <a:xfrm>
+            <a:off x="6140090" y="2583940"/>
+            <a:ext cx="0" cy="326541"/>
+          </a:xfrm>
+          <a:prstGeom prst="line">
+            <a:avLst/>
+          </a:prstGeom>
+          <a:ln w="28575"/>
+        </p:spPr>
+        <p:style>
+          <a:lnRef idx="1">
+            <a:schemeClr val="accent2"/>
+          </a:lnRef>
+          <a:fillRef idx="0">
+            <a:schemeClr val="accent2"/>
+          </a:fillRef>
+          <a:effectRef idx="0">
+            <a:schemeClr val="accent2"/>
+          </a:effectRef>
+          <a:fontRef idx="minor">
+            <a:schemeClr val="tx1"/>
+          </a:fontRef>
+        </p:style>
+      </p:cxnSp>
+      <p:cxnSp>
+        <p:nvCxnSpPr>
+          <p:cNvPr id="88" name="ตัวเชื่อมต่อตรง 87">
+            <a:extLst>
+              <a:ext uri="{FF2B5EF4-FFF2-40B4-BE49-F238E27FC236}">
+                <a16:creationId xmlns:a16="http://schemas.microsoft.com/office/drawing/2014/main" id="{0810D186-62DD-4D0B-9F93-D867913AF00E}"/>
+              </a:ext>
+            </a:extLst>
+          </p:cNvPr>
+          <p:cNvCxnSpPr>
+            <a:cxnSpLocks/>
+          </p:cNvCxnSpPr>
+          <p:nvPr/>
+        </p:nvCxnSpPr>
+        <p:spPr>
+          <a:xfrm>
+            <a:off x="7161363" y="2592992"/>
+            <a:ext cx="0" cy="326541"/>
+          </a:xfrm>
+          <a:prstGeom prst="line">
+            <a:avLst/>
+          </a:prstGeom>
+          <a:ln w="28575"/>
+        </p:spPr>
+        <p:style>
+          <a:lnRef idx="1">
+            <a:schemeClr val="accent2"/>
+          </a:lnRef>
+          <a:fillRef idx="0">
+            <a:schemeClr val="accent2"/>
+          </a:fillRef>
+          <a:effectRef idx="0">
+            <a:schemeClr val="accent2"/>
+          </a:effectRef>
+          <a:fontRef idx="minor">
+            <a:schemeClr val="tx1"/>
+          </a:fontRef>
+        </p:style>
+      </p:cxnSp>
+      <p:cxnSp>
+        <p:nvCxnSpPr>
+          <p:cNvPr id="89" name="ตัวเชื่อมต่อตรง 88">
+            <a:extLst>
+              <a:ext uri="{FF2B5EF4-FFF2-40B4-BE49-F238E27FC236}">
+                <a16:creationId xmlns:a16="http://schemas.microsoft.com/office/drawing/2014/main" id="{8E10DB1A-B52C-464C-9CB0-F61A3B4B3475}"/>
+              </a:ext>
+            </a:extLst>
+          </p:cNvPr>
+          <p:cNvCxnSpPr>
+            <a:cxnSpLocks/>
+          </p:cNvCxnSpPr>
+          <p:nvPr/>
+        </p:nvCxnSpPr>
+        <p:spPr>
+          <a:xfrm>
+            <a:off x="7161363" y="5156217"/>
+            <a:ext cx="0" cy="326541"/>
+          </a:xfrm>
+          <a:prstGeom prst="line">
+            <a:avLst/>
+          </a:prstGeom>
+          <a:ln w="28575"/>
+        </p:spPr>
+        <p:style>
+          <a:lnRef idx="1">
+            <a:schemeClr val="accent2"/>
+          </a:lnRef>
+          <a:fillRef idx="0">
+            <a:schemeClr val="accent2"/>
+          </a:fillRef>
+          <a:effectRef idx="0">
+            <a:schemeClr val="accent2"/>
+          </a:effectRef>
+          <a:fontRef idx="minor">
+            <a:schemeClr val="tx1"/>
+          </a:fontRef>
+        </p:style>
+      </p:cxnSp>
+      <p:cxnSp>
+        <p:nvCxnSpPr>
+          <p:cNvPr id="90" name="ตัวเชื่อมต่อตรง 89">
+            <a:extLst>
+              <a:ext uri="{FF2B5EF4-FFF2-40B4-BE49-F238E27FC236}">
+                <a16:creationId xmlns:a16="http://schemas.microsoft.com/office/drawing/2014/main" id="{CB4A4033-7CB1-4C80-B12D-0D45DE27434D}"/>
+              </a:ext>
+            </a:extLst>
+          </p:cNvPr>
+          <p:cNvCxnSpPr>
+            <a:cxnSpLocks/>
+          </p:cNvCxnSpPr>
+          <p:nvPr/>
+        </p:nvCxnSpPr>
+        <p:spPr>
+          <a:xfrm>
+            <a:off x="6124326" y="5135542"/>
+            <a:ext cx="0" cy="326541"/>
+          </a:xfrm>
+          <a:prstGeom prst="line">
+            <a:avLst/>
+          </a:prstGeom>
+          <a:ln w="28575"/>
+        </p:spPr>
+        <p:style>
+          <a:lnRef idx="1">
+            <a:schemeClr val="accent2"/>
+          </a:lnRef>
+          <a:fillRef idx="0">
+            <a:schemeClr val="accent2"/>
+          </a:fillRef>
+          <a:effectRef idx="0">
+            <a:schemeClr val="accent2"/>
+          </a:effectRef>
+          <a:fontRef idx="minor">
+            <a:schemeClr val="tx1"/>
+          </a:fontRef>
+        </p:style>
+      </p:cxnSp>
+      <p:cxnSp>
+        <p:nvCxnSpPr>
+          <p:cNvPr id="91" name="ตัวเชื่อมต่อตรง 90">
+            <a:extLst>
+              <a:ext uri="{FF2B5EF4-FFF2-40B4-BE49-F238E27FC236}">
+                <a16:creationId xmlns:a16="http://schemas.microsoft.com/office/drawing/2014/main" id="{9B65477A-7DF5-4BAD-8BA1-36D5D0A61B84}"/>
+              </a:ext>
+            </a:extLst>
+          </p:cNvPr>
+          <p:cNvCxnSpPr>
+            <a:cxnSpLocks/>
+          </p:cNvCxnSpPr>
+          <p:nvPr/>
+        </p:nvCxnSpPr>
+        <p:spPr>
+          <a:xfrm>
+            <a:off x="5053855" y="5135541"/>
+            <a:ext cx="0" cy="326541"/>
+          </a:xfrm>
+          <a:prstGeom prst="line">
+            <a:avLst/>
+          </a:prstGeom>
+          <a:ln w="28575"/>
+        </p:spPr>
+        <p:style>
+          <a:lnRef idx="1">
+            <a:schemeClr val="accent2"/>
+          </a:lnRef>
+          <a:fillRef idx="0">
+            <a:schemeClr val="accent2"/>
+          </a:fillRef>
+          <a:effectRef idx="0">
+            <a:schemeClr val="accent2"/>
+          </a:effectRef>
+          <a:fontRef idx="minor">
+            <a:schemeClr val="tx1"/>
+          </a:fontRef>
+        </p:style>
+      </p:cxnSp>
+      <p:cxnSp>
+        <p:nvCxnSpPr>
+          <p:cNvPr id="92" name="ตัวเชื่อมต่อตรง 91">
+            <a:extLst>
+              <a:ext uri="{FF2B5EF4-FFF2-40B4-BE49-F238E27FC236}">
+                <a16:creationId xmlns:a16="http://schemas.microsoft.com/office/drawing/2014/main" id="{7FF7060F-5905-4C41-BCBC-3F074A5B5633}"/>
+              </a:ext>
+            </a:extLst>
+          </p:cNvPr>
+          <p:cNvCxnSpPr>
+            <a:cxnSpLocks/>
+            <a:endCxn id="27" idx="0"/>
+          </p:cNvCxnSpPr>
+          <p:nvPr/>
+        </p:nvCxnSpPr>
+        <p:spPr>
+          <a:xfrm>
+            <a:off x="6124326" y="5462082"/>
+            <a:ext cx="0" cy="393711"/>
+          </a:xfrm>
+          <a:prstGeom prst="line">
+            <a:avLst/>
+          </a:prstGeom>
+          <a:ln w="28575"/>
+        </p:spPr>
+        <p:style>
+          <a:lnRef idx="1">
+            <a:schemeClr val="accent2"/>
+          </a:lnRef>
+          <a:fillRef idx="0">
+            <a:schemeClr val="accent2"/>
+          </a:fillRef>
+          <a:effectRef idx="0">
+            <a:schemeClr val="accent2"/>
+          </a:effectRef>
+          <a:fontRef idx="minor">
+            <a:schemeClr val="tx1"/>
+          </a:fontRef>
+        </p:style>
+      </p:cxnSp>
+      <p:cxnSp>
+        <p:nvCxnSpPr>
+          <p:cNvPr id="97" name="ตัวเชื่อมต่อตรง 96">
+            <a:extLst>
+              <a:ext uri="{FF2B5EF4-FFF2-40B4-BE49-F238E27FC236}">
+                <a16:creationId xmlns:a16="http://schemas.microsoft.com/office/drawing/2014/main" id="{ED8E3D33-B9B2-4972-8E61-BC5D0F0F4D54}"/>
+              </a:ext>
+            </a:extLst>
+          </p:cNvPr>
+          <p:cNvCxnSpPr>
+            <a:cxnSpLocks/>
+          </p:cNvCxnSpPr>
+          <p:nvPr/>
+        </p:nvCxnSpPr>
+        <p:spPr>
+          <a:xfrm>
+            <a:off x="7872550" y="1620509"/>
+            <a:ext cx="0" cy="2367657"/>
+          </a:xfrm>
+          <a:prstGeom prst="line">
+            <a:avLst/>
+          </a:prstGeom>
+          <a:ln w="28575">
+            <a:solidFill>
+              <a:srgbClr val="FF0000"/>
+            </a:solidFill>
+          </a:ln>
+        </p:spPr>
+        <p:style>
+          <a:lnRef idx="1">
+            <a:schemeClr val="accent2"/>
+          </a:lnRef>
+          <a:fillRef idx="0">
+            <a:schemeClr val="accent2"/>
+          </a:fillRef>
+          <a:effectRef idx="0">
+            <a:schemeClr val="accent2"/>
+          </a:effectRef>
+          <a:fontRef idx="minor">
+            <a:schemeClr val="tx1"/>
+          </a:fontRef>
+        </p:style>
+      </p:cxnSp>
+      <p:cxnSp>
+        <p:nvCxnSpPr>
+          <p:cNvPr id="100" name="ตัวเชื่อมต่อตรง 99">
+            <a:extLst>
+              <a:ext uri="{FF2B5EF4-FFF2-40B4-BE49-F238E27FC236}">
+                <a16:creationId xmlns:a16="http://schemas.microsoft.com/office/drawing/2014/main" id="{0A5B57C4-DDFC-4B6F-B39D-9075EFBB2371}"/>
+              </a:ext>
+            </a:extLst>
+          </p:cNvPr>
+          <p:cNvCxnSpPr>
+            <a:cxnSpLocks/>
+            <a:endCxn id="17" idx="3"/>
+          </p:cNvCxnSpPr>
+          <p:nvPr/>
+        </p:nvCxnSpPr>
+        <p:spPr>
+          <a:xfrm flipH="1">
+            <a:off x="7319569" y="3988166"/>
+            <a:ext cx="552981" cy="0"/>
+          </a:xfrm>
+          <a:prstGeom prst="line">
+            <a:avLst/>
+          </a:prstGeom>
+          <a:ln w="28575">
+            <a:solidFill>
+              <a:srgbClr val="FF0000"/>
+            </a:solidFill>
+          </a:ln>
+        </p:spPr>
+        <p:style>
+          <a:lnRef idx="1">
+            <a:schemeClr val="accent2"/>
+          </a:lnRef>
+          <a:fillRef idx="0">
+            <a:schemeClr val="accent2"/>
+          </a:fillRef>
+          <a:effectRef idx="0">
+            <a:schemeClr val="accent2"/>
+          </a:effectRef>
+          <a:fontRef idx="minor">
+            <a:schemeClr val="tx1"/>
+          </a:fontRef>
+        </p:style>
+      </p:cxnSp>
+      <p:cxnSp>
+        <p:nvCxnSpPr>
+          <p:cNvPr id="105" name="ตัวเชื่อมต่อตรง 104">
+            <a:extLst>
+              <a:ext uri="{FF2B5EF4-FFF2-40B4-BE49-F238E27FC236}">
+                <a16:creationId xmlns:a16="http://schemas.microsoft.com/office/drawing/2014/main" id="{9F671825-6B75-4B72-B0A4-EC9650C7DB1A}"/>
+              </a:ext>
+            </a:extLst>
+          </p:cNvPr>
+          <p:cNvCxnSpPr>
+            <a:cxnSpLocks/>
+            <a:endCxn id="12" idx="3"/>
+          </p:cNvCxnSpPr>
+          <p:nvPr/>
+        </p:nvCxnSpPr>
+        <p:spPr>
+          <a:xfrm flipH="1">
+            <a:off x="7319569" y="1639033"/>
+            <a:ext cx="552981" cy="0"/>
+          </a:xfrm>
+          <a:prstGeom prst="line">
+            <a:avLst/>
+          </a:prstGeom>
+          <a:ln w="28575">
+            <a:solidFill>
+              <a:srgbClr val="FF0000"/>
+            </a:solidFill>
+          </a:ln>
+        </p:spPr>
+        <p:style>
+          <a:lnRef idx="1">
+            <a:schemeClr val="accent2"/>
+          </a:lnRef>
+          <a:fillRef idx="0">
+            <a:schemeClr val="accent2"/>
+          </a:fillRef>
+          <a:effectRef idx="0">
+            <a:schemeClr val="accent2"/>
+          </a:effectRef>
+          <a:fontRef idx="minor">
+            <a:schemeClr val="tx1"/>
+          </a:fontRef>
+        </p:style>
+      </p:cxnSp>
+      <p:cxnSp>
+        <p:nvCxnSpPr>
+          <p:cNvPr id="110" name="ตัวเชื่อมต่อตรง 109">
+            <a:extLst>
+              <a:ext uri="{FF2B5EF4-FFF2-40B4-BE49-F238E27FC236}">
+                <a16:creationId xmlns:a16="http://schemas.microsoft.com/office/drawing/2014/main" id="{E264053E-9CCA-40A3-854E-847F82CBD4F3}"/>
+              </a:ext>
+            </a:extLst>
+          </p:cNvPr>
+          <p:cNvCxnSpPr>
+            <a:cxnSpLocks/>
+          </p:cNvCxnSpPr>
+          <p:nvPr/>
+        </p:nvCxnSpPr>
+        <p:spPr>
+          <a:xfrm flipH="1">
+            <a:off x="6253274" y="3621751"/>
+            <a:ext cx="1619276" cy="0"/>
+          </a:xfrm>
+          <a:prstGeom prst="line">
+            <a:avLst/>
+          </a:prstGeom>
+          <a:ln w="28575">
+            <a:solidFill>
+              <a:srgbClr val="FF0000"/>
+            </a:solidFill>
+          </a:ln>
+        </p:spPr>
+        <p:style>
+          <a:lnRef idx="1">
+            <a:schemeClr val="accent2"/>
+          </a:lnRef>
+          <a:fillRef idx="0">
+            <a:schemeClr val="accent2"/>
+          </a:fillRef>
+          <a:effectRef idx="0">
+            <a:schemeClr val="accent2"/>
+          </a:effectRef>
+          <a:fontRef idx="minor">
+            <a:schemeClr val="tx1"/>
+          </a:fontRef>
+        </p:style>
+      </p:cxnSp>
+      <p:cxnSp>
+        <p:nvCxnSpPr>
+          <p:cNvPr id="114" name="ตัวเชื่อมต่อตรง 113">
+            <a:extLst>
+              <a:ext uri="{FF2B5EF4-FFF2-40B4-BE49-F238E27FC236}">
+                <a16:creationId xmlns:a16="http://schemas.microsoft.com/office/drawing/2014/main" id="{74CBC59C-A851-4606-8BAD-E62744BB2548}"/>
+              </a:ext>
+            </a:extLst>
+          </p:cNvPr>
+          <p:cNvCxnSpPr>
+            <a:cxnSpLocks/>
+            <a:stCxn id="12" idx="1"/>
+            <a:endCxn id="11" idx="3"/>
+          </p:cNvCxnSpPr>
+          <p:nvPr/>
+        </p:nvCxnSpPr>
+        <p:spPr>
+          <a:xfrm flipH="1" flipV="1">
+            <a:off x="5749481" y="1631067"/>
+            <a:ext cx="707939" cy="7966"/>
+          </a:xfrm>
+          <a:prstGeom prst="line">
+            <a:avLst/>
+          </a:prstGeom>
+          <a:ln w="28575">
+            <a:solidFill>
+              <a:srgbClr val="7030A0"/>
+            </a:solidFill>
+          </a:ln>
+        </p:spPr>
+        <p:style>
+          <a:lnRef idx="1">
+            <a:schemeClr val="accent2"/>
+          </a:lnRef>
+          <a:fillRef idx="0">
+            <a:schemeClr val="accent2"/>
+          </a:fillRef>
+          <a:effectRef idx="0">
+            <a:schemeClr val="accent2"/>
+          </a:effectRef>
+          <a:fontRef idx="minor">
+            <a:schemeClr val="tx1"/>
+          </a:fontRef>
+        </p:style>
+      </p:cxnSp>
+      <p:cxnSp>
+        <p:nvCxnSpPr>
+          <p:cNvPr id="117" name="ตัวเชื่อมต่อตรง 116">
+            <a:extLst>
+              <a:ext uri="{FF2B5EF4-FFF2-40B4-BE49-F238E27FC236}">
+                <a16:creationId xmlns:a16="http://schemas.microsoft.com/office/drawing/2014/main" id="{A2C979CD-2990-4932-A5B4-CC27A238A789}"/>
+              </a:ext>
+            </a:extLst>
+          </p:cNvPr>
+          <p:cNvCxnSpPr>
+            <a:cxnSpLocks/>
+          </p:cNvCxnSpPr>
+          <p:nvPr/>
+        </p:nvCxnSpPr>
+        <p:spPr>
+          <a:xfrm flipV="1">
+            <a:off x="5460125" y="2197124"/>
+            <a:ext cx="0" cy="1325512"/>
+          </a:xfrm>
+          <a:prstGeom prst="line">
+            <a:avLst/>
+          </a:prstGeom>
+          <a:ln w="28575">
+            <a:solidFill>
+              <a:srgbClr val="7030A0"/>
+            </a:solidFill>
+          </a:ln>
+        </p:spPr>
+        <p:style>
+          <a:lnRef idx="1">
+            <a:schemeClr val="accent2"/>
+          </a:lnRef>
+          <a:fillRef idx="0">
+            <a:schemeClr val="accent2"/>
+          </a:fillRef>
+          <a:effectRef idx="0">
+            <a:schemeClr val="accent2"/>
+          </a:effectRef>
+          <a:fontRef idx="minor">
+            <a:schemeClr val="tx1"/>
+          </a:fontRef>
+        </p:style>
+      </p:cxnSp>
+    </p:spTree>
+    <p:extLst>
+      <p:ext uri="{BB962C8B-B14F-4D97-AF65-F5344CB8AC3E}">
+        <p14:creationId xmlns:p14="http://schemas.microsoft.com/office/powerpoint/2010/main" val="631231179"/>
+      </p:ext>
+    </p:extLst>
+  </p:cSld>
+  <p:clrMapOvr>
+    <a:masterClrMapping/>
+  </p:clrMapOvr>
+</p:sld>
+</file>
+
+<file path=ppt/slides/slide4.xml><?xml version="1.0" encoding="utf-8"?>
+<p:sld xmlns:a="http://schemas.openxmlformats.org/drawingml/2006/main" xmlns:r="http://schemas.openxmlformats.org/officeDocument/2006/relationships" xmlns:p="http://schemas.openxmlformats.org/presentationml/2006/main">
+  <p:cSld>
+    <p:spTree>
+      <p:nvGrpSpPr>
+        <p:cNvPr id="1" name=""/>
+        <p:cNvGrpSpPr/>
+        <p:nvPr/>
+      </p:nvGrpSpPr>
+      <p:grpSpPr>
+        <a:xfrm>
+          <a:off x="0" y="0"/>
+          <a:ext cx="0" cy="0"/>
+          <a:chOff x="0" y="0"/>
+          <a:chExt cx="0" cy="0"/>
+        </a:xfrm>
+      </p:grpSpPr>
+      <p:pic>
+        <p:nvPicPr>
+          <p:cNvPr id="4" name="รูปภาพ 3">
+            <a:extLst>
+              <a:ext uri="{FF2B5EF4-FFF2-40B4-BE49-F238E27FC236}">
+                <a16:creationId xmlns:a16="http://schemas.microsoft.com/office/drawing/2014/main" id="{403F3D50-EF7C-4C19-BE52-31F9EEF1D6A7}"/>
+              </a:ext>
+            </a:extLst>
+          </p:cNvPr>
+          <p:cNvPicPr>
+            <a:picLocks noChangeAspect="1"/>
+          </p:cNvPicPr>
+          <p:nvPr/>
+        </p:nvPicPr>
+        <p:blipFill>
+          <a:blip r:embed="rId2"/>
+          <a:stretch>
+            <a:fillRect/>
+          </a:stretch>
+        </p:blipFill>
+        <p:spPr>
+          <a:xfrm>
+            <a:off x="4022092" y="2182249"/>
+            <a:ext cx="3062380" cy="3009882"/>
+          </a:xfrm>
+          <a:prstGeom prst="rect">
+            <a:avLst/>
+          </a:prstGeom>
+        </p:spPr>
+      </p:pic>
+    </p:spTree>
+    <p:extLst>
+      <p:ext uri="{BB962C8B-B14F-4D97-AF65-F5344CB8AC3E}">
+        <p14:creationId xmlns:p14="http://schemas.microsoft.com/office/powerpoint/2010/main" val="1222167673"/>
+      </p:ext>
+    </p:extLst>
+  </p:cSld>
+  <p:clrMapOvr>
+    <a:masterClrMapping/>
+  </p:clrMapOvr>
+</p:sld>
+</file>
+
 <file path=ppt/theme/theme1.xml><?xml version="1.0" encoding="utf-8"?>
 <a:theme xmlns:a="http://schemas.openxmlformats.org/drawingml/2006/main" name="ธีมของ Office">
   <a:themeElements>

</xml_diff>